<commit_message>
Update for final repository
</commit_message>
<xml_diff>
--- a/Presentation_Slidedeck.pptx
+++ b/Presentation_Slidedeck.pptx
@@ -5,7 +5,7 @@
     <p:sldMasterId id="2147483648" r:id="rId1"/>
   </p:sldMasterIdLst>
   <p:notesMasterIdLst>
-    <p:notesMasterId r:id="rId15"/>
+    <p:notesMasterId r:id="rId18"/>
   </p:notesMasterIdLst>
   <p:sldIdLst>
     <p:sldId id="257" r:id="rId2"/>
@@ -19,8 +19,11 @@
     <p:sldId id="264" r:id="rId10"/>
     <p:sldId id="265" r:id="rId11"/>
     <p:sldId id="266" r:id="rId12"/>
-    <p:sldId id="267" r:id="rId13"/>
-    <p:sldId id="268" r:id="rId14"/>
+    <p:sldId id="270" r:id="rId13"/>
+    <p:sldId id="271" r:id="rId14"/>
+    <p:sldId id="272" r:id="rId15"/>
+    <p:sldId id="267" r:id="rId16"/>
+    <p:sldId id="268" r:id="rId17"/>
   </p:sldIdLst>
   <p:sldSz cx="12192000" cy="6858000"/>
   <p:notesSz cx="6858000" cy="9144000"/>
@@ -119,6 +122,11 @@
       </a:defRPr>
     </a:lvl9pPr>
   </p:defaultTextStyle>
+  <p:extLst>
+    <p:ext uri="{EFAFB233-063F-42B5-8137-9DF3F51BA10A}">
+      <p15:sldGuideLst xmlns:p15="http://schemas.microsoft.com/office/powerpoint/2012/main"/>
+    </p:ext>
+  </p:extLst>
 </p:presentation>
 </file>
 
@@ -204,7 +212,7 @@
           <a:p>
             <a:fld id="{A3FFFDA9-64FE-4DA2-B33D-E6A2DF1CF677}" type="datetimeFigureOut">
               <a:rPr lang="en-US" smtClean="0"/>
-              <a:t>2/18/2022</a:t>
+              <a:t>3/26/2022</a:t>
             </a:fld>
             <a:endParaRPr lang="en-US"/>
           </a:p>
@@ -892,6 +900,333 @@
     </p:spTree>
     <p:extLst>
       <p:ext uri="{BB962C8B-B14F-4D97-AF65-F5344CB8AC3E}">
+        <p14:creationId xmlns:p14="http://schemas.microsoft.com/office/powerpoint/2010/main" val="2057971938"/>
+      </p:ext>
+    </p:extLst>
+  </p:cSld>
+  <p:clrMapOvr>
+    <a:masterClrMapping/>
+  </p:clrMapOvr>
+</p:notes>
+</file>
+
+<file path=ppt/notesSlides/notesSlide13.xml><?xml version="1.0" encoding="utf-8"?>
+<p:notes xmlns:a="http://schemas.openxmlformats.org/drawingml/2006/main" xmlns:r="http://schemas.openxmlformats.org/officeDocument/2006/relationships" xmlns:p="http://schemas.openxmlformats.org/presentationml/2006/main" showMasterSp="0" showMasterPhAnim="0">
+  <p:cSld>
+    <p:spTree>
+      <p:nvGrpSpPr>
+        <p:cNvPr id="1" name="Shape 56"/>
+        <p:cNvGrpSpPr/>
+        <p:nvPr/>
+      </p:nvGrpSpPr>
+      <p:grpSpPr>
+        <a:xfrm>
+          <a:off x="0" y="0"/>
+          <a:ext cx="0" cy="0"/>
+          <a:chOff x="0" y="0"/>
+          <a:chExt cx="0" cy="0"/>
+        </a:xfrm>
+      </p:grpSpPr>
+      <p:sp>
+        <p:nvSpPr>
+          <p:cNvPr id="57" name="Google Shape;57;gf68779015e_0_0:notes"/>
+          <p:cNvSpPr>
+            <a:spLocks noGrp="1" noRot="1" noChangeAspect="1"/>
+          </p:cNvSpPr>
+          <p:nvPr>
+            <p:ph type="sldImg" idx="2"/>
+          </p:nvPr>
+        </p:nvSpPr>
+        <p:spPr>
+          <a:xfrm>
+            <a:off x="381000" y="685800"/>
+            <a:ext cx="6096000" cy="3429000"/>
+          </a:xfrm>
+          <a:custGeom>
+            <a:avLst/>
+            <a:gdLst/>
+            <a:ahLst/>
+            <a:cxnLst/>
+            <a:rect l="l" t="t" r="r" b="b"/>
+            <a:pathLst>
+              <a:path w="120000" h="120000" extrusionOk="0">
+                <a:moveTo>
+                  <a:pt x="0" y="0"/>
+                </a:moveTo>
+                <a:lnTo>
+                  <a:pt x="120000" y="0"/>
+                </a:lnTo>
+                <a:lnTo>
+                  <a:pt x="120000" y="120000"/>
+                </a:lnTo>
+                <a:lnTo>
+                  <a:pt x="0" y="120000"/>
+                </a:lnTo>
+                <a:close/>
+              </a:path>
+            </a:pathLst>
+          </a:custGeom>
+        </p:spPr>
+      </p:sp>
+      <p:sp>
+        <p:nvSpPr>
+          <p:cNvPr id="58" name="Google Shape;58;gf68779015e_0_0:notes"/>
+          <p:cNvSpPr txBox="1">
+            <a:spLocks noGrp="1"/>
+          </p:cNvSpPr>
+          <p:nvPr>
+            <p:ph type="body" idx="1"/>
+          </p:nvPr>
+        </p:nvSpPr>
+        <p:spPr>
+          <a:xfrm>
+            <a:off x="685800" y="4343400"/>
+            <a:ext cx="5486400" cy="4114800"/>
+          </a:xfrm>
+          <a:prstGeom prst="rect">
+            <a:avLst/>
+          </a:prstGeom>
+        </p:spPr>
+        <p:txBody>
+          <a:bodyPr spcFirstLastPara="1" wrap="square" lIns="91425" tIns="91425" rIns="91425" bIns="91425" anchor="t" anchorCtr="0">
+            <a:noAutofit/>
+          </a:bodyPr>
+          <a:lstStyle/>
+          <a:p>
+            <a:pPr marL="0" lvl="0" indent="0" algn="l" rtl="0">
+              <a:spcBef>
+                <a:spcPts val="0"/>
+              </a:spcBef>
+              <a:spcAft>
+                <a:spcPts val="0"/>
+              </a:spcAft>
+              <a:buNone/>
+            </a:pPr>
+            <a:endParaRPr/>
+          </a:p>
+        </p:txBody>
+      </p:sp>
+    </p:spTree>
+    <p:extLst>
+      <p:ext uri="{BB962C8B-B14F-4D97-AF65-F5344CB8AC3E}">
+        <p14:creationId xmlns:p14="http://schemas.microsoft.com/office/powerpoint/2010/main" val="2702159295"/>
+      </p:ext>
+    </p:extLst>
+  </p:cSld>
+  <p:clrMapOvr>
+    <a:masterClrMapping/>
+  </p:clrMapOvr>
+</p:notes>
+</file>
+
+<file path=ppt/notesSlides/notesSlide14.xml><?xml version="1.0" encoding="utf-8"?>
+<p:notes xmlns:a="http://schemas.openxmlformats.org/drawingml/2006/main" xmlns:r="http://schemas.openxmlformats.org/officeDocument/2006/relationships" xmlns:p="http://schemas.openxmlformats.org/presentationml/2006/main" showMasterSp="0" showMasterPhAnim="0">
+  <p:cSld>
+    <p:spTree>
+      <p:nvGrpSpPr>
+        <p:cNvPr id="1" name="Shape 56"/>
+        <p:cNvGrpSpPr/>
+        <p:nvPr/>
+      </p:nvGrpSpPr>
+      <p:grpSpPr>
+        <a:xfrm>
+          <a:off x="0" y="0"/>
+          <a:ext cx="0" cy="0"/>
+          <a:chOff x="0" y="0"/>
+          <a:chExt cx="0" cy="0"/>
+        </a:xfrm>
+      </p:grpSpPr>
+      <p:sp>
+        <p:nvSpPr>
+          <p:cNvPr id="57" name="Google Shape;57;gf68779015e_0_0:notes"/>
+          <p:cNvSpPr>
+            <a:spLocks noGrp="1" noRot="1" noChangeAspect="1"/>
+          </p:cNvSpPr>
+          <p:nvPr>
+            <p:ph type="sldImg" idx="2"/>
+          </p:nvPr>
+        </p:nvSpPr>
+        <p:spPr>
+          <a:xfrm>
+            <a:off x="381000" y="685800"/>
+            <a:ext cx="6096000" cy="3429000"/>
+          </a:xfrm>
+          <a:custGeom>
+            <a:avLst/>
+            <a:gdLst/>
+            <a:ahLst/>
+            <a:cxnLst/>
+            <a:rect l="l" t="t" r="r" b="b"/>
+            <a:pathLst>
+              <a:path w="120000" h="120000" extrusionOk="0">
+                <a:moveTo>
+                  <a:pt x="0" y="0"/>
+                </a:moveTo>
+                <a:lnTo>
+                  <a:pt x="120000" y="0"/>
+                </a:lnTo>
+                <a:lnTo>
+                  <a:pt x="120000" y="120000"/>
+                </a:lnTo>
+                <a:lnTo>
+                  <a:pt x="0" y="120000"/>
+                </a:lnTo>
+                <a:close/>
+              </a:path>
+            </a:pathLst>
+          </a:custGeom>
+        </p:spPr>
+      </p:sp>
+      <p:sp>
+        <p:nvSpPr>
+          <p:cNvPr id="58" name="Google Shape;58;gf68779015e_0_0:notes"/>
+          <p:cNvSpPr txBox="1">
+            <a:spLocks noGrp="1"/>
+          </p:cNvSpPr>
+          <p:nvPr>
+            <p:ph type="body" idx="1"/>
+          </p:nvPr>
+        </p:nvSpPr>
+        <p:spPr>
+          <a:xfrm>
+            <a:off x="685800" y="4343400"/>
+            <a:ext cx="5486400" cy="4114800"/>
+          </a:xfrm>
+          <a:prstGeom prst="rect">
+            <a:avLst/>
+          </a:prstGeom>
+        </p:spPr>
+        <p:txBody>
+          <a:bodyPr spcFirstLastPara="1" wrap="square" lIns="91425" tIns="91425" rIns="91425" bIns="91425" anchor="t" anchorCtr="0">
+            <a:noAutofit/>
+          </a:bodyPr>
+          <a:lstStyle/>
+          <a:p>
+            <a:pPr marL="0" lvl="0" indent="0" algn="l" rtl="0">
+              <a:spcBef>
+                <a:spcPts val="0"/>
+              </a:spcBef>
+              <a:spcAft>
+                <a:spcPts val="0"/>
+              </a:spcAft>
+              <a:buNone/>
+            </a:pPr>
+            <a:endParaRPr/>
+          </a:p>
+        </p:txBody>
+      </p:sp>
+    </p:spTree>
+    <p:extLst>
+      <p:ext uri="{BB962C8B-B14F-4D97-AF65-F5344CB8AC3E}">
+        <p14:creationId xmlns:p14="http://schemas.microsoft.com/office/powerpoint/2010/main" val="2424263122"/>
+      </p:ext>
+    </p:extLst>
+  </p:cSld>
+  <p:clrMapOvr>
+    <a:masterClrMapping/>
+  </p:clrMapOvr>
+</p:notes>
+</file>
+
+<file path=ppt/notesSlides/notesSlide15.xml><?xml version="1.0" encoding="utf-8"?>
+<p:notes xmlns:a="http://schemas.openxmlformats.org/drawingml/2006/main" xmlns:r="http://schemas.openxmlformats.org/officeDocument/2006/relationships" xmlns:p="http://schemas.openxmlformats.org/presentationml/2006/main" showMasterSp="0" showMasterPhAnim="0">
+  <p:cSld>
+    <p:spTree>
+      <p:nvGrpSpPr>
+        <p:cNvPr id="1" name="Shape 56"/>
+        <p:cNvGrpSpPr/>
+        <p:nvPr/>
+      </p:nvGrpSpPr>
+      <p:grpSpPr>
+        <a:xfrm>
+          <a:off x="0" y="0"/>
+          <a:ext cx="0" cy="0"/>
+          <a:chOff x="0" y="0"/>
+          <a:chExt cx="0" cy="0"/>
+        </a:xfrm>
+      </p:grpSpPr>
+      <p:sp>
+        <p:nvSpPr>
+          <p:cNvPr id="57" name="Google Shape;57;gf68779015e_0_0:notes"/>
+          <p:cNvSpPr>
+            <a:spLocks noGrp="1" noRot="1" noChangeAspect="1"/>
+          </p:cNvSpPr>
+          <p:nvPr>
+            <p:ph type="sldImg" idx="2"/>
+          </p:nvPr>
+        </p:nvSpPr>
+        <p:spPr>
+          <a:xfrm>
+            <a:off x="381000" y="685800"/>
+            <a:ext cx="6096000" cy="3429000"/>
+          </a:xfrm>
+          <a:custGeom>
+            <a:avLst/>
+            <a:gdLst/>
+            <a:ahLst/>
+            <a:cxnLst/>
+            <a:rect l="l" t="t" r="r" b="b"/>
+            <a:pathLst>
+              <a:path w="120000" h="120000" extrusionOk="0">
+                <a:moveTo>
+                  <a:pt x="0" y="0"/>
+                </a:moveTo>
+                <a:lnTo>
+                  <a:pt x="120000" y="0"/>
+                </a:lnTo>
+                <a:lnTo>
+                  <a:pt x="120000" y="120000"/>
+                </a:lnTo>
+                <a:lnTo>
+                  <a:pt x="0" y="120000"/>
+                </a:lnTo>
+                <a:close/>
+              </a:path>
+            </a:pathLst>
+          </a:custGeom>
+        </p:spPr>
+      </p:sp>
+      <p:sp>
+        <p:nvSpPr>
+          <p:cNvPr id="58" name="Google Shape;58;gf68779015e_0_0:notes"/>
+          <p:cNvSpPr txBox="1">
+            <a:spLocks noGrp="1"/>
+          </p:cNvSpPr>
+          <p:nvPr>
+            <p:ph type="body" idx="1"/>
+          </p:nvPr>
+        </p:nvSpPr>
+        <p:spPr>
+          <a:xfrm>
+            <a:off x="685800" y="4343400"/>
+            <a:ext cx="5486400" cy="4114800"/>
+          </a:xfrm>
+          <a:prstGeom prst="rect">
+            <a:avLst/>
+          </a:prstGeom>
+        </p:spPr>
+        <p:txBody>
+          <a:bodyPr spcFirstLastPara="1" wrap="square" lIns="91425" tIns="91425" rIns="91425" bIns="91425" anchor="t" anchorCtr="0">
+            <a:noAutofit/>
+          </a:bodyPr>
+          <a:lstStyle/>
+          <a:p>
+            <a:pPr marL="0" lvl="0" indent="0" algn="l" rtl="0">
+              <a:spcBef>
+                <a:spcPts val="0"/>
+              </a:spcBef>
+              <a:spcAft>
+                <a:spcPts val="0"/>
+              </a:spcAft>
+              <a:buNone/>
+            </a:pPr>
+            <a:endParaRPr/>
+          </a:p>
+        </p:txBody>
+      </p:sp>
+    </p:spTree>
+    <p:extLst>
+      <p:ext uri="{BB962C8B-B14F-4D97-AF65-F5344CB8AC3E}">
         <p14:creationId xmlns:p14="http://schemas.microsoft.com/office/powerpoint/2010/main" val="2521652792"/>
       </p:ext>
     </p:extLst>
@@ -902,7 +1237,7 @@
 </p:notes>
 </file>
 
-<file path=ppt/notesSlides/notesSlide13.xml><?xml version="1.0" encoding="utf-8"?>
+<file path=ppt/notesSlides/notesSlide16.xml><?xml version="1.0" encoding="utf-8"?>
 <p:notes xmlns:a="http://schemas.openxmlformats.org/drawingml/2006/main" xmlns:r="http://schemas.openxmlformats.org/officeDocument/2006/relationships" xmlns:p="http://schemas.openxmlformats.org/presentationml/2006/main" showMasterSp="0" showMasterPhAnim="0">
   <p:cSld>
     <p:spTree>
@@ -2025,7 +2360,7 @@
           <a:p>
             <a:fld id="{017A8336-2832-4D7A-8A02-DE67BB88D58B}" type="datetimeFigureOut">
               <a:rPr lang="en-US" smtClean="0"/>
-              <a:t>2/18/2022</a:t>
+              <a:t>3/26/2022</a:t>
             </a:fld>
             <a:endParaRPr lang="en-US"/>
           </a:p>
@@ -2223,7 +2558,7 @@
           <a:p>
             <a:fld id="{017A8336-2832-4D7A-8A02-DE67BB88D58B}" type="datetimeFigureOut">
               <a:rPr lang="en-US" smtClean="0"/>
-              <a:t>2/18/2022</a:t>
+              <a:t>3/26/2022</a:t>
             </a:fld>
             <a:endParaRPr lang="en-US"/>
           </a:p>
@@ -2431,7 +2766,7 @@
           <a:p>
             <a:fld id="{017A8336-2832-4D7A-8A02-DE67BB88D58B}" type="datetimeFigureOut">
               <a:rPr lang="en-US" smtClean="0"/>
-              <a:t>2/18/2022</a:t>
+              <a:t>3/26/2022</a:t>
             </a:fld>
             <a:endParaRPr lang="en-US"/>
           </a:p>
@@ -2988,7 +3323,7 @@
           <a:p>
             <a:fld id="{017A8336-2832-4D7A-8A02-DE67BB88D58B}" type="datetimeFigureOut">
               <a:rPr lang="en-US" smtClean="0"/>
-              <a:t>2/18/2022</a:t>
+              <a:t>3/26/2022</a:t>
             </a:fld>
             <a:endParaRPr lang="en-US"/>
           </a:p>
@@ -3263,7 +3598,7 @@
           <a:p>
             <a:fld id="{017A8336-2832-4D7A-8A02-DE67BB88D58B}" type="datetimeFigureOut">
               <a:rPr lang="en-US" smtClean="0"/>
-              <a:t>2/18/2022</a:t>
+              <a:t>3/26/2022</a:t>
             </a:fld>
             <a:endParaRPr lang="en-US"/>
           </a:p>
@@ -3528,7 +3863,7 @@
           <a:p>
             <a:fld id="{017A8336-2832-4D7A-8A02-DE67BB88D58B}" type="datetimeFigureOut">
               <a:rPr lang="en-US" smtClean="0"/>
-              <a:t>2/18/2022</a:t>
+              <a:t>3/26/2022</a:t>
             </a:fld>
             <a:endParaRPr lang="en-US"/>
           </a:p>
@@ -3940,7 +4275,7 @@
           <a:p>
             <a:fld id="{017A8336-2832-4D7A-8A02-DE67BB88D58B}" type="datetimeFigureOut">
               <a:rPr lang="en-US" smtClean="0"/>
-              <a:t>2/18/2022</a:t>
+              <a:t>3/26/2022</a:t>
             </a:fld>
             <a:endParaRPr lang="en-US"/>
           </a:p>
@@ -4081,7 +4416,7 @@
           <a:p>
             <a:fld id="{017A8336-2832-4D7A-8A02-DE67BB88D58B}" type="datetimeFigureOut">
               <a:rPr lang="en-US" smtClean="0"/>
-              <a:t>2/18/2022</a:t>
+              <a:t>3/26/2022</a:t>
             </a:fld>
             <a:endParaRPr lang="en-US"/>
           </a:p>
@@ -4194,7 +4529,7 @@
           <a:p>
             <a:fld id="{017A8336-2832-4D7A-8A02-DE67BB88D58B}" type="datetimeFigureOut">
               <a:rPr lang="en-US" smtClean="0"/>
-              <a:t>2/18/2022</a:t>
+              <a:t>3/26/2022</a:t>
             </a:fld>
             <a:endParaRPr lang="en-US"/>
           </a:p>
@@ -4505,7 +4840,7 @@
           <a:p>
             <a:fld id="{017A8336-2832-4D7A-8A02-DE67BB88D58B}" type="datetimeFigureOut">
               <a:rPr lang="en-US" smtClean="0"/>
-              <a:t>2/18/2022</a:t>
+              <a:t>3/26/2022</a:t>
             </a:fld>
             <a:endParaRPr lang="en-US"/>
           </a:p>
@@ -4793,7 +5128,7 @@
           <a:p>
             <a:fld id="{017A8336-2832-4D7A-8A02-DE67BB88D58B}" type="datetimeFigureOut">
               <a:rPr lang="en-US" smtClean="0"/>
-              <a:t>2/18/2022</a:t>
+              <a:t>3/26/2022</a:t>
             </a:fld>
             <a:endParaRPr lang="en-US"/>
           </a:p>
@@ -5034,7 +5369,7 @@
           <a:p>
             <a:fld id="{017A8336-2832-4D7A-8A02-DE67BB88D58B}" type="datetimeFigureOut">
               <a:rPr lang="en-US" smtClean="0"/>
-              <a:t>2/18/2022</a:t>
+              <a:t>3/26/2022</a:t>
             </a:fld>
             <a:endParaRPr lang="en-US"/>
           </a:p>
@@ -5628,6 +5963,14 @@
   <p:clrMapOvr>
     <a:masterClrMapping/>
   </p:clrMapOvr>
+  <mc:AlternateContent xmlns:mc="http://schemas.openxmlformats.org/markup-compatibility/2006">
+    <mc:Choice xmlns:p14="http://schemas.microsoft.com/office/powerpoint/2010/main" Requires="p14">
+      <p:transition spd="slow" p14:dur="2000" advTm="6132"/>
+    </mc:Choice>
+    <mc:Fallback>
+      <p:transition spd="slow" advTm="6132"/>
+    </mc:Fallback>
+  </mc:AlternateContent>
 </p:sld>
 </file>
 
@@ -5958,22 +6301,6 @@
               <a:t>Expand the search limit to be bigger than 30</a:t>
             </a:r>
           </a:p>
-          <a:p>
-            <a:endParaRPr lang="en-US" b="1" dirty="0">
-              <a:solidFill>
-                <a:srgbClr val="FF0000"/>
-              </a:solidFill>
-            </a:endParaRPr>
-          </a:p>
-          <a:p>
-            <a:pPr marL="152396" indent="0">
-              <a:buNone/>
-            </a:pPr>
-            <a:r>
-              <a:rPr lang="en-US" sz="2000" dirty="0"/>
-              <a:t>The unfinished features will be what we need to finish before wrapping up the final project</a:t>
-            </a:r>
-          </a:p>
         </p:txBody>
       </p:sp>
     </p:spTree>
@@ -6033,6 +6360,285 @@
           <a:p>
             <a:r>
               <a:rPr lang="en-US" b="1" dirty="0"/>
+              <a:t>8. Result (cont.)</a:t>
+            </a:r>
+            <a:endParaRPr b="1" dirty="0"/>
+          </a:p>
+        </p:txBody>
+      </p:sp>
+      <p:pic>
+        <p:nvPicPr>
+          <p:cNvPr id="10" name="Picture 9">
+            <a:extLst>
+              <a:ext uri="{FF2B5EF4-FFF2-40B4-BE49-F238E27FC236}">
+                <a16:creationId xmlns:a16="http://schemas.microsoft.com/office/drawing/2014/main" id="{4926AAC2-1983-4A67-AD9C-0F19CEED471F}"/>
+              </a:ext>
+            </a:extLst>
+          </p:cNvPr>
+          <p:cNvPicPr>
+            <a:picLocks noChangeAspect="1"/>
+          </p:cNvPicPr>
+          <p:nvPr/>
+        </p:nvPicPr>
+        <p:blipFill>
+          <a:blip r:embed="rId3"/>
+          <a:stretch>
+            <a:fillRect/>
+          </a:stretch>
+        </p:blipFill>
+        <p:spPr>
+          <a:xfrm>
+            <a:off x="519112" y="1371254"/>
+            <a:ext cx="11153775" cy="5305425"/>
+          </a:xfrm>
+          <a:prstGeom prst="rect">
+            <a:avLst/>
+          </a:prstGeom>
+        </p:spPr>
+      </p:pic>
+    </p:spTree>
+    <p:extLst>
+      <p:ext uri="{BB962C8B-B14F-4D97-AF65-F5344CB8AC3E}">
+        <p14:creationId xmlns:p14="http://schemas.microsoft.com/office/powerpoint/2010/main" val="380095224"/>
+      </p:ext>
+    </p:extLst>
+  </p:cSld>
+  <p:clrMapOvr>
+    <a:masterClrMapping/>
+  </p:clrMapOvr>
+</p:sld>
+</file>
+
+<file path=ppt/slides/slide13.xml><?xml version="1.0" encoding="utf-8"?>
+<p:sld xmlns:a="http://schemas.openxmlformats.org/drawingml/2006/main" xmlns:r="http://schemas.openxmlformats.org/officeDocument/2006/relationships" xmlns:p="http://schemas.openxmlformats.org/presentationml/2006/main">
+  <p:cSld>
+    <p:spTree>
+      <p:nvGrpSpPr>
+        <p:cNvPr id="1" name="Shape 59"/>
+        <p:cNvGrpSpPr/>
+        <p:nvPr/>
+      </p:nvGrpSpPr>
+      <p:grpSpPr>
+        <a:xfrm>
+          <a:off x="0" y="0"/>
+          <a:ext cx="0" cy="0"/>
+          <a:chOff x="0" y="0"/>
+          <a:chExt cx="0" cy="0"/>
+        </a:xfrm>
+      </p:grpSpPr>
+      <p:sp>
+        <p:nvSpPr>
+          <p:cNvPr id="60" name="Google Shape;60;p14"/>
+          <p:cNvSpPr txBox="1">
+            <a:spLocks noGrp="1"/>
+          </p:cNvSpPr>
+          <p:nvPr>
+            <p:ph type="title"/>
+          </p:nvPr>
+        </p:nvSpPr>
+        <p:spPr>
+          <a:xfrm>
+            <a:off x="415600" y="593367"/>
+            <a:ext cx="11360800" cy="763600"/>
+          </a:xfrm>
+          <a:prstGeom prst="rect">
+            <a:avLst/>
+          </a:prstGeom>
+        </p:spPr>
+        <p:txBody>
+          <a:bodyPr spcFirstLastPara="1" vert="horz" wrap="square" lIns="121900" tIns="121900" rIns="121900" bIns="121900" rtlCol="0" anchor="t" anchorCtr="0">
+            <a:normAutofit fontScale="90000"/>
+          </a:bodyPr>
+          <a:lstStyle/>
+          <a:p>
+            <a:r>
+              <a:rPr lang="en-US" b="1" dirty="0"/>
+              <a:t>8. Result (cont.)</a:t>
+            </a:r>
+            <a:endParaRPr b="1" dirty="0"/>
+          </a:p>
+        </p:txBody>
+      </p:sp>
+      <p:pic>
+        <p:nvPicPr>
+          <p:cNvPr id="4" name="Picture 3">
+            <a:extLst>
+              <a:ext uri="{FF2B5EF4-FFF2-40B4-BE49-F238E27FC236}">
+                <a16:creationId xmlns:a16="http://schemas.microsoft.com/office/drawing/2014/main" id="{D80A13D2-3BAF-4971-94E7-BC16D04BF626}"/>
+              </a:ext>
+            </a:extLst>
+          </p:cNvPr>
+          <p:cNvPicPr>
+            <a:picLocks noChangeAspect="1"/>
+          </p:cNvPicPr>
+          <p:nvPr/>
+        </p:nvPicPr>
+        <p:blipFill>
+          <a:blip r:embed="rId3"/>
+          <a:stretch>
+            <a:fillRect/>
+          </a:stretch>
+        </p:blipFill>
+        <p:spPr>
+          <a:xfrm>
+            <a:off x="728662" y="1440559"/>
+            <a:ext cx="10268691" cy="5003104"/>
+          </a:xfrm>
+          <a:prstGeom prst="rect">
+            <a:avLst/>
+          </a:prstGeom>
+        </p:spPr>
+      </p:pic>
+    </p:spTree>
+    <p:extLst>
+      <p:ext uri="{BB962C8B-B14F-4D97-AF65-F5344CB8AC3E}">
+        <p14:creationId xmlns:p14="http://schemas.microsoft.com/office/powerpoint/2010/main" val="1444864131"/>
+      </p:ext>
+    </p:extLst>
+  </p:cSld>
+  <p:clrMapOvr>
+    <a:masterClrMapping/>
+  </p:clrMapOvr>
+</p:sld>
+</file>
+
+<file path=ppt/slides/slide14.xml><?xml version="1.0" encoding="utf-8"?>
+<p:sld xmlns:a="http://schemas.openxmlformats.org/drawingml/2006/main" xmlns:r="http://schemas.openxmlformats.org/officeDocument/2006/relationships" xmlns:p="http://schemas.openxmlformats.org/presentationml/2006/main">
+  <p:cSld>
+    <p:spTree>
+      <p:nvGrpSpPr>
+        <p:cNvPr id="1" name="Shape 59"/>
+        <p:cNvGrpSpPr/>
+        <p:nvPr/>
+      </p:nvGrpSpPr>
+      <p:grpSpPr>
+        <a:xfrm>
+          <a:off x="0" y="0"/>
+          <a:ext cx="0" cy="0"/>
+          <a:chOff x="0" y="0"/>
+          <a:chExt cx="0" cy="0"/>
+        </a:xfrm>
+      </p:grpSpPr>
+      <p:sp>
+        <p:nvSpPr>
+          <p:cNvPr id="60" name="Google Shape;60;p14"/>
+          <p:cNvSpPr txBox="1">
+            <a:spLocks noGrp="1"/>
+          </p:cNvSpPr>
+          <p:nvPr>
+            <p:ph type="title"/>
+          </p:nvPr>
+        </p:nvSpPr>
+        <p:spPr>
+          <a:xfrm>
+            <a:off x="415600" y="593367"/>
+            <a:ext cx="11360800" cy="763600"/>
+          </a:xfrm>
+          <a:prstGeom prst="rect">
+            <a:avLst/>
+          </a:prstGeom>
+        </p:spPr>
+        <p:txBody>
+          <a:bodyPr spcFirstLastPara="1" vert="horz" wrap="square" lIns="121900" tIns="121900" rIns="121900" bIns="121900" rtlCol="0" anchor="t" anchorCtr="0">
+            <a:normAutofit fontScale="90000"/>
+          </a:bodyPr>
+          <a:lstStyle/>
+          <a:p>
+            <a:r>
+              <a:rPr lang="en-US" b="1" dirty="0"/>
+              <a:t>8. Result (cont.)</a:t>
+            </a:r>
+            <a:endParaRPr b="1" dirty="0"/>
+          </a:p>
+        </p:txBody>
+      </p:sp>
+      <p:pic>
+        <p:nvPicPr>
+          <p:cNvPr id="3" name="Picture 2">
+            <a:extLst>
+              <a:ext uri="{FF2B5EF4-FFF2-40B4-BE49-F238E27FC236}">
+                <a16:creationId xmlns:a16="http://schemas.microsoft.com/office/drawing/2014/main" id="{50631D79-57F1-4F67-B834-4585BBBB0F75}"/>
+              </a:ext>
+            </a:extLst>
+          </p:cNvPr>
+          <p:cNvPicPr>
+            <a:picLocks noChangeAspect="1"/>
+          </p:cNvPicPr>
+          <p:nvPr/>
+        </p:nvPicPr>
+        <p:blipFill>
+          <a:blip r:embed="rId3"/>
+          <a:stretch>
+            <a:fillRect/>
+          </a:stretch>
+        </p:blipFill>
+        <p:spPr>
+          <a:xfrm>
+            <a:off x="1604963" y="1387832"/>
+            <a:ext cx="8439150" cy="5175891"/>
+          </a:xfrm>
+          <a:prstGeom prst="rect">
+            <a:avLst/>
+          </a:prstGeom>
+        </p:spPr>
+      </p:pic>
+    </p:spTree>
+    <p:extLst>
+      <p:ext uri="{BB962C8B-B14F-4D97-AF65-F5344CB8AC3E}">
+        <p14:creationId xmlns:p14="http://schemas.microsoft.com/office/powerpoint/2010/main" val="2419530472"/>
+      </p:ext>
+    </p:extLst>
+  </p:cSld>
+  <p:clrMapOvr>
+    <a:masterClrMapping/>
+  </p:clrMapOvr>
+</p:sld>
+</file>
+
+<file path=ppt/slides/slide15.xml><?xml version="1.0" encoding="utf-8"?>
+<p:sld xmlns:a="http://schemas.openxmlformats.org/drawingml/2006/main" xmlns:r="http://schemas.openxmlformats.org/officeDocument/2006/relationships" xmlns:p="http://schemas.openxmlformats.org/presentationml/2006/main">
+  <p:cSld>
+    <p:spTree>
+      <p:nvGrpSpPr>
+        <p:cNvPr id="1" name="Shape 59"/>
+        <p:cNvGrpSpPr/>
+        <p:nvPr/>
+      </p:nvGrpSpPr>
+      <p:grpSpPr>
+        <a:xfrm>
+          <a:off x="0" y="0"/>
+          <a:ext cx="0" cy="0"/>
+          <a:chOff x="0" y="0"/>
+          <a:chExt cx="0" cy="0"/>
+        </a:xfrm>
+      </p:grpSpPr>
+      <p:sp>
+        <p:nvSpPr>
+          <p:cNvPr id="60" name="Google Shape;60;p14"/>
+          <p:cNvSpPr txBox="1">
+            <a:spLocks noGrp="1"/>
+          </p:cNvSpPr>
+          <p:nvPr>
+            <p:ph type="title"/>
+          </p:nvPr>
+        </p:nvSpPr>
+        <p:spPr>
+          <a:xfrm>
+            <a:off x="415600" y="593367"/>
+            <a:ext cx="11360800" cy="763600"/>
+          </a:xfrm>
+          <a:prstGeom prst="rect">
+            <a:avLst/>
+          </a:prstGeom>
+        </p:spPr>
+        <p:txBody>
+          <a:bodyPr spcFirstLastPara="1" vert="horz" wrap="square" lIns="121900" tIns="121900" rIns="121900" bIns="121900" rtlCol="0" anchor="t" anchorCtr="0">
+            <a:normAutofit fontScale="90000"/>
+          </a:bodyPr>
+          <a:lstStyle/>
+          <a:p>
+            <a:r>
+              <a:rPr lang="en-US" b="1" dirty="0"/>
               <a:t>9. Challenge</a:t>
             </a:r>
             <a:endParaRPr b="1" dirty="0"/>
@@ -6124,7 +6730,7 @@
 </p:sld>
 </file>
 
-<file path=ppt/slides/slide13.xml><?xml version="1.0" encoding="utf-8"?>
+<file path=ppt/slides/slide16.xml><?xml version="1.0" encoding="utf-8"?>
 <p:sld xmlns:a="http://schemas.openxmlformats.org/drawingml/2006/main" xmlns:r="http://schemas.openxmlformats.org/officeDocument/2006/relationships" xmlns:p="http://schemas.openxmlformats.org/presentationml/2006/main">
   <p:cSld>
     <p:spTree>
@@ -6364,6 +6970,14 @@
   <p:clrMapOvr>
     <a:masterClrMapping/>
   </p:clrMapOvr>
+  <mc:AlternateContent xmlns:mc="http://schemas.openxmlformats.org/markup-compatibility/2006">
+    <mc:Choice xmlns:p14="http://schemas.microsoft.com/office/powerpoint/2010/main" Requires="p14">
+      <p:transition spd="slow" p14:dur="2000" advTm="3374"/>
+    </mc:Choice>
+    <mc:Fallback>
+      <p:transition spd="slow" advTm="3374"/>
+    </mc:Fallback>
+  </mc:AlternateContent>
 </p:sld>
 </file>
 
@@ -7400,6 +8014,14 @@
   <p:clrMapOvr>
     <a:masterClrMapping/>
   </p:clrMapOvr>
+  <mc:AlternateContent xmlns:mc="http://schemas.openxmlformats.org/markup-compatibility/2006">
+    <mc:Choice xmlns:p14="http://schemas.microsoft.com/office/powerpoint/2010/main" Requires="p14">
+      <p:transition spd="slow" p14:dur="2000" advTm="6142"/>
+    </mc:Choice>
+    <mc:Fallback>
+      <p:transition spd="slow" advTm="6142"/>
+    </mc:Fallback>
+  </mc:AlternateContent>
 </p:sld>
 </file>
 
@@ -7516,6 +8138,14 @@
   <p:clrMapOvr>
     <a:masterClrMapping/>
   </p:clrMapOvr>
+  <mc:AlternateContent xmlns:mc="http://schemas.openxmlformats.org/markup-compatibility/2006" xmlns:p14="http://schemas.microsoft.com/office/powerpoint/2010/main">
+    <mc:Choice Requires="p14">
+      <p:transition spd="slow" p14:dur="2000" advTm="4266"/>
+    </mc:Choice>
+    <mc:Fallback xmlns="">
+      <p:transition spd="slow" advTm="4266"/>
+    </mc:Fallback>
+  </mc:AlternateContent>
 </p:sld>
 </file>
 
@@ -7666,6 +8296,14 @@
   <p:clrMapOvr>
     <a:masterClrMapping/>
   </p:clrMapOvr>
+  <mc:AlternateContent xmlns:mc="http://schemas.openxmlformats.org/markup-compatibility/2006" xmlns:p14="http://schemas.microsoft.com/office/powerpoint/2010/main">
+    <mc:Choice Requires="p14">
+      <p:transition spd="slow" p14:dur="2000" advTm="872"/>
+    </mc:Choice>
+    <mc:Fallback xmlns="">
+      <p:transition spd="slow" advTm="872"/>
+    </mc:Fallback>
+  </mc:AlternateContent>
 </p:sld>
 </file>
 

</xml_diff>